<commit_message>
finished corection of my thesis from 1.1
</commit_message>
<xml_diff>
--- a/img/source vectorgrafics/plandocheckact.pptx
+++ b/img/source vectorgrafics/plandocheckact.pptx
@@ -104,6 +104,11 @@
       </a:defRPr>
     </a:lvl9pPr>
   </p:defaultTextStyle>
+  <p:extLst>
+    <p:ext uri="{EFAFB233-063F-42B5-8137-9DF3F51BA10A}">
+      <p15:sldGuideLst xmlns:p15="http://schemas.microsoft.com/office/powerpoint/2012/main"/>
+    </p:ext>
+  </p:extLst>
 </p:presentation>
 </file>
 
@@ -4698,7 +4703,7 @@
           <a:p>
             <a:fld id="{E6428987-22C1-4614-92A9-1E6D0A2398E3}" type="datetimeFigureOut">
               <a:rPr lang="de-DE" smtClean="0"/>
-              <a:t>27.03.2020</a:t>
+              <a:t>20.04.2020</a:t>
             </a:fld>
             <a:endParaRPr lang="de-DE"/>
           </a:p>
@@ -4896,7 +4901,7 @@
           <a:p>
             <a:fld id="{E6428987-22C1-4614-92A9-1E6D0A2398E3}" type="datetimeFigureOut">
               <a:rPr lang="de-DE" smtClean="0"/>
-              <a:t>27.03.2020</a:t>
+              <a:t>20.04.2020</a:t>
             </a:fld>
             <a:endParaRPr lang="de-DE"/>
           </a:p>
@@ -5104,7 +5109,7 @@
           <a:p>
             <a:fld id="{E6428987-22C1-4614-92A9-1E6D0A2398E3}" type="datetimeFigureOut">
               <a:rPr lang="de-DE" smtClean="0"/>
-              <a:t>27.03.2020</a:t>
+              <a:t>20.04.2020</a:t>
             </a:fld>
             <a:endParaRPr lang="de-DE"/>
           </a:p>
@@ -5302,7 +5307,7 @@
           <a:p>
             <a:fld id="{E6428987-22C1-4614-92A9-1E6D0A2398E3}" type="datetimeFigureOut">
               <a:rPr lang="de-DE" smtClean="0"/>
-              <a:t>27.03.2020</a:t>
+              <a:t>20.04.2020</a:t>
             </a:fld>
             <a:endParaRPr lang="de-DE"/>
           </a:p>
@@ -5577,7 +5582,7 @@
           <a:p>
             <a:fld id="{E6428987-22C1-4614-92A9-1E6D0A2398E3}" type="datetimeFigureOut">
               <a:rPr lang="de-DE" smtClean="0"/>
-              <a:t>27.03.2020</a:t>
+              <a:t>20.04.2020</a:t>
             </a:fld>
             <a:endParaRPr lang="de-DE"/>
           </a:p>
@@ -5842,7 +5847,7 @@
           <a:p>
             <a:fld id="{E6428987-22C1-4614-92A9-1E6D0A2398E3}" type="datetimeFigureOut">
               <a:rPr lang="de-DE" smtClean="0"/>
-              <a:t>27.03.2020</a:t>
+              <a:t>20.04.2020</a:t>
             </a:fld>
             <a:endParaRPr lang="de-DE"/>
           </a:p>
@@ -6254,7 +6259,7 @@
           <a:p>
             <a:fld id="{E6428987-22C1-4614-92A9-1E6D0A2398E3}" type="datetimeFigureOut">
               <a:rPr lang="de-DE" smtClean="0"/>
-              <a:t>27.03.2020</a:t>
+              <a:t>20.04.2020</a:t>
             </a:fld>
             <a:endParaRPr lang="de-DE"/>
           </a:p>
@@ -6395,7 +6400,7 @@
           <a:p>
             <a:fld id="{E6428987-22C1-4614-92A9-1E6D0A2398E3}" type="datetimeFigureOut">
               <a:rPr lang="de-DE" smtClean="0"/>
-              <a:t>27.03.2020</a:t>
+              <a:t>20.04.2020</a:t>
             </a:fld>
             <a:endParaRPr lang="de-DE"/>
           </a:p>
@@ -6508,7 +6513,7 @@
           <a:p>
             <a:fld id="{E6428987-22C1-4614-92A9-1E6D0A2398E3}" type="datetimeFigureOut">
               <a:rPr lang="de-DE" smtClean="0"/>
-              <a:t>27.03.2020</a:t>
+              <a:t>20.04.2020</a:t>
             </a:fld>
             <a:endParaRPr lang="de-DE"/>
           </a:p>
@@ -6819,7 +6824,7 @@
           <a:p>
             <a:fld id="{E6428987-22C1-4614-92A9-1E6D0A2398E3}" type="datetimeFigureOut">
               <a:rPr lang="de-DE" smtClean="0"/>
-              <a:t>27.03.2020</a:t>
+              <a:t>20.04.2020</a:t>
             </a:fld>
             <a:endParaRPr lang="de-DE"/>
           </a:p>
@@ -7107,7 +7112,7 @@
           <a:p>
             <a:fld id="{E6428987-22C1-4614-92A9-1E6D0A2398E3}" type="datetimeFigureOut">
               <a:rPr lang="de-DE" smtClean="0"/>
-              <a:t>27.03.2020</a:t>
+              <a:t>20.04.2020</a:t>
             </a:fld>
             <a:endParaRPr lang="de-DE"/>
           </a:p>
@@ -7348,7 +7353,7 @@
           <a:p>
             <a:fld id="{E6428987-22C1-4614-92A9-1E6D0A2398E3}" type="datetimeFigureOut">
               <a:rPr lang="de-DE" smtClean="0"/>
-              <a:t>27.03.2020</a:t>
+              <a:t>20.04.2020</a:t>
             </a:fld>
             <a:endParaRPr lang="de-DE"/>
           </a:p>
@@ -7996,7 +8001,7 @@
             </a:pPr>
             <a:r>
               <a:rPr lang="de-DE"/>
-              <a:t>Entwicklen</a:t>
+              <a:t>Entwickeln</a:t>
             </a:r>
             <a:endParaRPr lang="de-DE" dirty="0"/>
           </a:p>

</xml_diff>